<commit_message>
Updated the ppt to refer to the latest lib jars
</commit_message>
<xml_diff>
--- a/docs/Piazza Diary Autograder Tutorial.pptx
+++ b/docs/Piazza Diary Autograder Tutorial.pptx
@@ -212,7 +212,7 @@
           <a:p>
             <a:fld id="{7422F263-BAA7-6740-B112-0F6D5F516690}" type="datetimeFigureOut">
               <a:rPr lang="en-US" smtClean="0"/>
-              <a:t>9/6/21</a:t>
+              <a:t>9/13/2022</a:t>
             </a:fld>
             <a:endParaRPr lang="en-US"/>
           </a:p>
@@ -626,7 +626,7 @@
           <a:p>
             <a:fld id="{896502EC-5A23-0A42-8CE2-62DA425351FD}" type="datetime1">
               <a:rPr lang="en-US" smtClean="0"/>
-              <a:t>9/6/21</a:t>
+              <a:t>9/13/2022</a:t>
             </a:fld>
             <a:endParaRPr lang="en-US"/>
           </a:p>
@@ -824,7 +824,7 @@
           <a:p>
             <a:fld id="{D4A8F505-58D0-304A-A36F-58ADBDAC934B}" type="datetime1">
               <a:rPr lang="en-US" smtClean="0"/>
-              <a:t>9/6/21</a:t>
+              <a:t>9/13/2022</a:t>
             </a:fld>
             <a:endParaRPr lang="en-US"/>
           </a:p>
@@ -1032,7 +1032,7 @@
           <a:p>
             <a:fld id="{FCEA910F-D549-5E4F-97F6-8D509E0E9BDD}" type="datetime1">
               <a:rPr lang="en-US" smtClean="0"/>
-              <a:t>9/6/21</a:t>
+              <a:t>9/13/2022</a:t>
             </a:fld>
             <a:endParaRPr lang="en-US"/>
           </a:p>
@@ -1230,7 +1230,7 @@
           <a:p>
             <a:fld id="{44209C88-7C98-0348-B3C7-2D7D384B6554}" type="datetime1">
               <a:rPr lang="en-US" smtClean="0"/>
-              <a:t>9/6/21</a:t>
+              <a:t>9/13/2022</a:t>
             </a:fld>
             <a:endParaRPr lang="en-US"/>
           </a:p>
@@ -1505,7 +1505,7 @@
           <a:p>
             <a:fld id="{16A306BC-6468-D042-91BE-D7318A474707}" type="datetime1">
               <a:rPr lang="en-US" smtClean="0"/>
-              <a:t>9/6/21</a:t>
+              <a:t>9/13/2022</a:t>
             </a:fld>
             <a:endParaRPr lang="en-US"/>
           </a:p>
@@ -1770,7 +1770,7 @@
           <a:p>
             <a:fld id="{D410E309-B1C9-8E4B-A776-397F7B6150D7}" type="datetime1">
               <a:rPr lang="en-US" smtClean="0"/>
-              <a:t>9/6/21</a:t>
+              <a:t>9/13/2022</a:t>
             </a:fld>
             <a:endParaRPr lang="en-US"/>
           </a:p>
@@ -2182,7 +2182,7 @@
           <a:p>
             <a:fld id="{5D9DACEE-CCCB-744F-BFB5-DFE4EEC695A8}" type="datetime1">
               <a:rPr lang="en-US" smtClean="0"/>
-              <a:t>9/6/21</a:t>
+              <a:t>9/13/2022</a:t>
             </a:fld>
             <a:endParaRPr lang="en-US"/>
           </a:p>
@@ -2323,7 +2323,7 @@
           <a:p>
             <a:fld id="{F73DEDB5-AFB0-8945-B3B0-F7CE0DE2EB2B}" type="datetime1">
               <a:rPr lang="en-US" smtClean="0"/>
-              <a:t>9/6/21</a:t>
+              <a:t>9/13/2022</a:t>
             </a:fld>
             <a:endParaRPr lang="en-US"/>
           </a:p>
@@ -2436,7 +2436,7 @@
           <a:p>
             <a:fld id="{4B310B16-AD6B-2740-8D03-5860BD4FCB60}" type="datetime1">
               <a:rPr lang="en-US" smtClean="0"/>
-              <a:t>9/6/21</a:t>
+              <a:t>9/13/2022</a:t>
             </a:fld>
             <a:endParaRPr lang="en-US"/>
           </a:p>
@@ -2747,7 +2747,7 @@
           <a:p>
             <a:fld id="{7122DBEA-AA5B-D049-9788-9DADF5933C32}" type="datetime1">
               <a:rPr lang="en-US" smtClean="0"/>
-              <a:t>9/6/21</a:t>
+              <a:t>9/13/2022</a:t>
             </a:fld>
             <a:endParaRPr lang="en-US"/>
           </a:p>
@@ -3035,7 +3035,7 @@
           <a:p>
             <a:fld id="{0EB13761-5A7E-1143-8C15-3DF5A46AE827}" type="datetime1">
               <a:rPr lang="en-US" smtClean="0"/>
-              <a:t>9/6/21</a:t>
+              <a:t>9/13/2022</a:t>
             </a:fld>
             <a:endParaRPr lang="en-US"/>
           </a:p>
@@ -3276,7 +3276,7 @@
           <a:p>
             <a:fld id="{FD7A3075-D7AA-EB44-A467-263FB152E4BA}" type="datetime1">
               <a:rPr lang="en-US" smtClean="0"/>
-              <a:t>9/6/21</a:t>
+              <a:t>9/13/2022</a:t>
             </a:fld>
             <a:endParaRPr lang="en-US"/>
           </a:p>
@@ -5597,21 +5597,13 @@
         <p:spPr/>
         <p:txBody>
           <a:bodyPr>
-            <a:normAutofit lnSpcReduction="10000"/>
+            <a:normAutofit fontScale="77500" lnSpcReduction="20000"/>
           </a:bodyPr>
           <a:lstStyle/>
           <a:p>
             <a:r>
               <a:rPr lang="en-US" dirty="0"/>
-              <a:t>Download “Piazza Grader </a:t>
-            </a:r>
-            <a:r>
-              <a:rPr lang="en-US" dirty="0" err="1"/>
-              <a:t>Jars.zip</a:t>
-            </a:r>
-            <a:r>
-              <a:rPr lang="en-US" dirty="0"/>
-              <a:t>” from:</a:t>
+              <a:t>Download “Piazza Grader Jars.zip” from:</a:t>
             </a:r>
             <a:br>
               <a:rPr lang="en-US" dirty="0"/>
@@ -5620,9 +5612,28 @@
               <a:rPr lang="en-US" dirty="0">
                 <a:hlinkClick r:id="rId2"/>
               </a:rPr>
-              <a:t>https://drive.google.com/drive/u/1/folders/1_1leF0DLFDnq7ci2_27Ci-0g22WR1iHh</a:t>
-            </a:r>
+              <a:t>https://</a:t>
+            </a:r>
+            <a:r>
+              <a:rPr lang="en-US" dirty="0" smtClean="0">
+                <a:hlinkClick r:id="rId2"/>
+              </a:rPr>
+              <a:t>drive.google.com/drive/u/1/folders/1_1leF0DLFDnq7ci2_27Ci-0g22WR1iHh</a:t>
+            </a:r>
+            <a:endParaRPr lang="en-US" dirty="0" smtClean="0"/>
+          </a:p>
+          <a:p>
             <a:endParaRPr lang="en-US" dirty="0"/>
+          </a:p>
+          <a:p>
+            <a:r>
+              <a:rPr lang="en-US" dirty="0" smtClean="0"/>
+              <a:t>Update: the latest lib is in</a:t>
+            </a:r>
+            <a:r>
+              <a:rPr lang="en-US" dirty="0"/>
+              <a:t>:   https://drive.google.com/open?id=1-F4wi9eoTfh6ar2KWTL06RT-ALKOUkPM&amp;authuser=dewan%40cs.unc.edu&amp;usp=drive_fs</a:t>
+            </a:r>
           </a:p>
           <a:p>
             <a:endParaRPr lang="en-US" dirty="0"/>

</xml_diff>